<commit_message>
SV Lisa + CNAME
</commit_message>
<xml_diff>
--- a/2022-01-20_generic flowchart template.pptx
+++ b/2022-01-20_generic flowchart template.pptx
@@ -201,7 +201,7 @@
           <a:p>
             <a:fld id="{36608864-00A1-464B-931C-CA225E2423B2}" type="datetimeFigureOut">
               <a:rPr lang="en-GB" smtClean="0"/>
-              <a:t>21/01/2022</a:t>
+              <a:t>22/03/2022</a:t>
             </a:fld>
             <a:endParaRPr lang="en-GB"/>
           </a:p>
@@ -1083,7 +1083,7 @@
           <a:p>
             <a:fld id="{3D3E481E-9A2B-436C-BE2A-336FCB62C8CC}" type="datetimeFigureOut">
               <a:rPr lang="en-SE" smtClean="0"/>
-              <a:t>01/21/2022</a:t>
+              <a:t>03/22/2022</a:t>
             </a:fld>
             <a:endParaRPr lang="en-SE"/>
           </a:p>
@@ -1253,7 +1253,7 @@
           <a:p>
             <a:fld id="{3D3E481E-9A2B-436C-BE2A-336FCB62C8CC}" type="datetimeFigureOut">
               <a:rPr lang="en-SE" smtClean="0"/>
-              <a:t>01/21/2022</a:t>
+              <a:t>03/22/2022</a:t>
             </a:fld>
             <a:endParaRPr lang="en-SE"/>
           </a:p>
@@ -1433,7 +1433,7 @@
           <a:p>
             <a:fld id="{3D3E481E-9A2B-436C-BE2A-336FCB62C8CC}" type="datetimeFigureOut">
               <a:rPr lang="en-SE" smtClean="0"/>
-              <a:t>01/21/2022</a:t>
+              <a:t>03/22/2022</a:t>
             </a:fld>
             <a:endParaRPr lang="en-SE"/>
           </a:p>
@@ -1625,7 +1625,7 @@
           <a:p>
             <a:fld id="{8357AAC5-1CFB-45DD-8DC7-6D62E4C80E50}" type="datetimeFigureOut">
               <a:rPr lang="en-GB" smtClean="0"/>
-              <a:t>21/01/2022</a:t>
+              <a:t>22/03/2022</a:t>
             </a:fld>
             <a:endParaRPr lang="en-GB"/>
           </a:p>
@@ -1795,7 +1795,7 @@
           <a:p>
             <a:fld id="{8357AAC5-1CFB-45DD-8DC7-6D62E4C80E50}" type="datetimeFigureOut">
               <a:rPr lang="en-GB" smtClean="0"/>
-              <a:t>21/01/2022</a:t>
+              <a:t>22/03/2022</a:t>
             </a:fld>
             <a:endParaRPr lang="en-GB"/>
           </a:p>
@@ -2041,7 +2041,7 @@
           <a:p>
             <a:fld id="{8357AAC5-1CFB-45DD-8DC7-6D62E4C80E50}" type="datetimeFigureOut">
               <a:rPr lang="en-GB" smtClean="0"/>
-              <a:t>21/01/2022</a:t>
+              <a:t>22/03/2022</a:t>
             </a:fld>
             <a:endParaRPr lang="en-GB"/>
           </a:p>
@@ -2273,7 +2273,7 @@
           <a:p>
             <a:fld id="{8357AAC5-1CFB-45DD-8DC7-6D62E4C80E50}" type="datetimeFigureOut">
               <a:rPr lang="en-GB" smtClean="0"/>
-              <a:t>21/01/2022</a:t>
+              <a:t>22/03/2022</a:t>
             </a:fld>
             <a:endParaRPr lang="en-GB"/>
           </a:p>
@@ -2640,7 +2640,7 @@
           <a:p>
             <a:fld id="{8357AAC5-1CFB-45DD-8DC7-6D62E4C80E50}" type="datetimeFigureOut">
               <a:rPr lang="en-GB" smtClean="0"/>
-              <a:t>21/01/2022</a:t>
+              <a:t>22/03/2022</a:t>
             </a:fld>
             <a:endParaRPr lang="en-GB"/>
           </a:p>
@@ -2758,7 +2758,7 @@
           <a:p>
             <a:fld id="{8357AAC5-1CFB-45DD-8DC7-6D62E4C80E50}" type="datetimeFigureOut">
               <a:rPr lang="en-GB" smtClean="0"/>
-              <a:t>21/01/2022</a:t>
+              <a:t>22/03/2022</a:t>
             </a:fld>
             <a:endParaRPr lang="en-GB"/>
           </a:p>
@@ -2853,7 +2853,7 @@
           <a:p>
             <a:fld id="{8357AAC5-1CFB-45DD-8DC7-6D62E4C80E50}" type="datetimeFigureOut">
               <a:rPr lang="en-GB" smtClean="0"/>
-              <a:t>21/01/2022</a:t>
+              <a:t>22/03/2022</a:t>
             </a:fld>
             <a:endParaRPr lang="en-GB"/>
           </a:p>
@@ -3130,7 +3130,7 @@
           <a:p>
             <a:fld id="{8357AAC5-1CFB-45DD-8DC7-6D62E4C80E50}" type="datetimeFigureOut">
               <a:rPr lang="en-GB" smtClean="0"/>
-              <a:t>21/01/2022</a:t>
+              <a:t>22/03/2022</a:t>
             </a:fld>
             <a:endParaRPr lang="en-GB"/>
           </a:p>
@@ -3300,7 +3300,7 @@
           <a:p>
             <a:fld id="{3D3E481E-9A2B-436C-BE2A-336FCB62C8CC}" type="datetimeFigureOut">
               <a:rPr lang="en-SE" smtClean="0"/>
-              <a:t>01/21/2022</a:t>
+              <a:t>03/22/2022</a:t>
             </a:fld>
             <a:endParaRPr lang="en-SE"/>
           </a:p>
@@ -3557,7 +3557,7 @@
           <a:p>
             <a:fld id="{8357AAC5-1CFB-45DD-8DC7-6D62E4C80E50}" type="datetimeFigureOut">
               <a:rPr lang="en-GB" smtClean="0"/>
-              <a:t>21/01/2022</a:t>
+              <a:t>22/03/2022</a:t>
             </a:fld>
             <a:endParaRPr lang="en-GB"/>
           </a:p>
@@ -3727,7 +3727,7 @@
           <a:p>
             <a:fld id="{8357AAC5-1CFB-45DD-8DC7-6D62E4C80E50}" type="datetimeFigureOut">
               <a:rPr lang="en-GB" smtClean="0"/>
-              <a:t>21/01/2022</a:t>
+              <a:t>22/03/2022</a:t>
             </a:fld>
             <a:endParaRPr lang="en-GB"/>
           </a:p>
@@ -3907,7 +3907,7 @@
           <a:p>
             <a:fld id="{8357AAC5-1CFB-45DD-8DC7-6D62E4C80E50}" type="datetimeFigureOut">
               <a:rPr lang="en-GB" smtClean="0"/>
-              <a:t>21/01/2022</a:t>
+              <a:t>22/03/2022</a:t>
             </a:fld>
             <a:endParaRPr lang="en-GB"/>
           </a:p>
@@ -4153,7 +4153,7 @@
           <a:p>
             <a:fld id="{3D3E481E-9A2B-436C-BE2A-336FCB62C8CC}" type="datetimeFigureOut">
               <a:rPr lang="en-SE" smtClean="0"/>
-              <a:t>01/21/2022</a:t>
+              <a:t>03/22/2022</a:t>
             </a:fld>
             <a:endParaRPr lang="en-SE"/>
           </a:p>
@@ -4385,7 +4385,7 @@
           <a:p>
             <a:fld id="{3D3E481E-9A2B-436C-BE2A-336FCB62C8CC}" type="datetimeFigureOut">
               <a:rPr lang="en-SE" smtClean="0"/>
-              <a:t>01/21/2022</a:t>
+              <a:t>03/22/2022</a:t>
             </a:fld>
             <a:endParaRPr lang="en-SE"/>
           </a:p>
@@ -4752,7 +4752,7 @@
           <a:p>
             <a:fld id="{3D3E481E-9A2B-436C-BE2A-336FCB62C8CC}" type="datetimeFigureOut">
               <a:rPr lang="en-SE" smtClean="0"/>
-              <a:t>01/21/2022</a:t>
+              <a:t>03/22/2022</a:t>
             </a:fld>
             <a:endParaRPr lang="en-SE"/>
           </a:p>
@@ -4870,7 +4870,7 @@
           <a:p>
             <a:fld id="{3D3E481E-9A2B-436C-BE2A-336FCB62C8CC}" type="datetimeFigureOut">
               <a:rPr lang="en-SE" smtClean="0"/>
-              <a:t>01/21/2022</a:t>
+              <a:t>03/22/2022</a:t>
             </a:fld>
             <a:endParaRPr lang="en-SE"/>
           </a:p>
@@ -4965,7 +4965,7 @@
           <a:p>
             <a:fld id="{3D3E481E-9A2B-436C-BE2A-336FCB62C8CC}" type="datetimeFigureOut">
               <a:rPr lang="en-SE" smtClean="0"/>
-              <a:t>01/21/2022</a:t>
+              <a:t>03/22/2022</a:t>
             </a:fld>
             <a:endParaRPr lang="en-SE"/>
           </a:p>
@@ -5242,7 +5242,7 @@
           <a:p>
             <a:fld id="{3D3E481E-9A2B-436C-BE2A-336FCB62C8CC}" type="datetimeFigureOut">
               <a:rPr lang="en-SE" smtClean="0"/>
-              <a:t>01/21/2022</a:t>
+              <a:t>03/22/2022</a:t>
             </a:fld>
             <a:endParaRPr lang="en-SE"/>
           </a:p>
@@ -5499,7 +5499,7 @@
           <a:p>
             <a:fld id="{3D3E481E-9A2B-436C-BE2A-336FCB62C8CC}" type="datetimeFigureOut">
               <a:rPr lang="en-SE" smtClean="0"/>
-              <a:t>01/21/2022</a:t>
+              <a:t>03/22/2022</a:t>
             </a:fld>
             <a:endParaRPr lang="en-SE"/>
           </a:p>
@@ -5712,7 +5712,7 @@
           <a:p>
             <a:fld id="{3D3E481E-9A2B-436C-BE2A-336FCB62C8CC}" type="datetimeFigureOut">
               <a:rPr lang="en-SE" smtClean="0"/>
-              <a:t>01/21/2022</a:t>
+              <a:t>03/22/2022</a:t>
             </a:fld>
             <a:endParaRPr lang="en-SE"/>
           </a:p>
@@ -6252,7 +6252,7 @@
           <a:p>
             <a:fld id="{8357AAC5-1CFB-45DD-8DC7-6D62E4C80E50}" type="datetimeFigureOut">
               <a:rPr lang="en-GB" smtClean="0"/>
-              <a:t>21/01/2022</a:t>
+              <a:t>22/03/2022</a:t>
             </a:fld>
             <a:endParaRPr lang="en-GB"/>
           </a:p>
@@ -14077,7 +14077,7 @@
                 </a:solidFill>
                 <a:latin typeface="+mj-lt"/>
               </a:rPr>
-              <a:t>Biokolsystem</a:t>
+              <a:t>Biokolssystem</a:t>
             </a:r>
             <a:endParaRPr lang="sv-SE" sz="2400" i="1" dirty="0">
               <a:solidFill>
@@ -14177,7 +14177,16 @@
                   </a:solidFill>
                   <a:latin typeface="Calibri Light" panose="020F0302020204030204"/>
                 </a:rPr>
-                <a:t>Biomassa produktion</a:t>
+                <a:t>P</a:t>
+              </a:r>
+              <a:r>
+                <a:rPr lang="sv-SE" sz="2800" kern="0" dirty="0" smtClean="0">
+                  <a:solidFill>
+                    <a:prstClr val="black"/>
+                  </a:solidFill>
+                  <a:latin typeface="Calibri Light" panose="020F0302020204030204"/>
+                </a:rPr>
+                <a:t>roduktion av biomassa</a:t>
               </a:r>
               <a:endParaRPr lang="sv-SE" sz="2800" kern="0" dirty="0">
                 <a:solidFill>
@@ -14334,19 +14343,23 @@
                 <a:defRPr/>
               </a:pPr>
               <a:r>
-                <a:rPr lang="sv-SE" sz="2800" kern="0" dirty="0" smtClean="0">
+                <a:rPr lang="sv-SE" sz="2800" kern="0" dirty="0" err="1" smtClean="0">
                   <a:solidFill>
                     <a:prstClr val="black"/>
                   </a:solidFill>
                   <a:latin typeface="Calibri Light" panose="020F0302020204030204"/>
                 </a:rPr>
-                <a:t>Biomassa</a:t>
+                <a:t>P</a:t>
               </a:r>
-            </a:p>
-            <a:p>
-              <a:pPr algn="ctr" defTabSz="914346">
-                <a:defRPr/>
-              </a:pPr>
+              <a:r>
+                <a:rPr lang="sv-SE" sz="2800" kern="0" dirty="0" err="1" smtClean="0">
+                  <a:solidFill>
+                    <a:prstClr val="black"/>
+                  </a:solidFill>
+                  <a:latin typeface="Calibri Light" panose="020F0302020204030204"/>
+                </a:rPr>
+                <a:t>yrolys</a:t>
+              </a:r>
               <a:r>
                 <a:rPr lang="sv-SE" sz="2800" kern="0" dirty="0" smtClean="0">
                   <a:solidFill>
@@ -14354,7 +14367,7 @@
                   </a:solidFill>
                   <a:latin typeface="Calibri Light" panose="020F0302020204030204"/>
                 </a:rPr>
-                <a:t>pyrolys</a:t>
+                <a:t> av biomassa</a:t>
               </a:r>
               <a:endParaRPr lang="sv-SE" sz="2800" kern="0" dirty="0">
                 <a:solidFill>
@@ -14486,7 +14499,34 @@
                   </a:solidFill>
                   <a:latin typeface="Calibri Light" panose="020F0302020204030204"/>
                 </a:rPr>
-                <a:t>Olja och gas användning</a:t>
+                <a:t>Olja- </a:t>
+              </a:r>
+              <a:r>
+                <a:rPr lang="sv-SE" sz="2800" kern="0" dirty="0" smtClean="0">
+                  <a:solidFill>
+                    <a:prstClr val="black"/>
+                  </a:solidFill>
+                  <a:latin typeface="Calibri Light" panose="020F0302020204030204"/>
+                </a:rPr>
+                <a:t>och </a:t>
+              </a:r>
+              <a:r>
+                <a:rPr lang="sv-SE" sz="2800" kern="0" dirty="0" smtClean="0">
+                  <a:solidFill>
+                    <a:prstClr val="black"/>
+                  </a:solidFill>
+                  <a:latin typeface="Calibri Light" panose="020F0302020204030204"/>
+                </a:rPr>
+                <a:t>gas- </a:t>
+              </a:r>
+              <a:r>
+                <a:rPr lang="sv-SE" sz="2800" kern="0" dirty="0" smtClean="0">
+                  <a:solidFill>
+                    <a:prstClr val="black"/>
+                  </a:solidFill>
+                  <a:latin typeface="Calibri Light" panose="020F0302020204030204"/>
+                </a:rPr>
+                <a:t>användning</a:t>
               </a:r>
               <a:endParaRPr lang="sv-SE" sz="2800" kern="0" dirty="0">
                 <a:solidFill>
@@ -14700,10 +14740,10 @@
         </p:nvGrpSpPr>
         <p:grpSpPr>
           <a:xfrm>
-            <a:off x="4084976" y="3767141"/>
-            <a:ext cx="2688028" cy="1457292"/>
-            <a:chOff x="16673951" y="9278451"/>
-            <a:chExt cx="2857376" cy="1725903"/>
+            <a:off x="4084974" y="3767142"/>
+            <a:ext cx="2688028" cy="1457293"/>
+            <a:chOff x="16673949" y="9278451"/>
+            <a:chExt cx="2857376" cy="1725904"/>
           </a:xfrm>
         </p:grpSpPr>
         <p:sp>
@@ -14714,7 +14754,7 @@
           </p:nvSpPr>
           <p:spPr>
             <a:xfrm>
-              <a:off x="16673951" y="9732500"/>
+              <a:off x="16673949" y="9732501"/>
               <a:ext cx="2857376" cy="1271854"/>
             </a:xfrm>
             <a:prstGeom prst="rect">
@@ -14743,13 +14783,13 @@
                 <a:defRPr/>
               </a:pPr>
               <a:r>
-                <a:rPr lang="sv-SE" sz="2800" kern="0" dirty="0">
+                <a:rPr lang="sv-SE" sz="2800" kern="0" dirty="0" smtClean="0">
                   <a:solidFill>
                     <a:prstClr val="black"/>
                   </a:solidFill>
                   <a:latin typeface="Calibri Light" panose="020F0302020204030204"/>
                 </a:rPr>
-                <a:t>Biokolprodukt </a:t>
+                <a:t>T</a:t>
               </a:r>
               <a:r>
                 <a:rPr lang="sv-SE" sz="2800" kern="0" dirty="0" smtClean="0">
@@ -14758,7 +14798,7 @@
                   </a:solidFill>
                   <a:latin typeface="Calibri Light" panose="020F0302020204030204"/>
                 </a:rPr>
-                <a:t>tillverkning</a:t>
+                <a:t>illverkning av biokolsprodukt</a:t>
               </a:r>
               <a:endParaRPr lang="sv-SE" sz="2800" kern="0" dirty="0">
                 <a:solidFill>
@@ -14890,7 +14930,16 @@
                   </a:solidFill>
                   <a:latin typeface="Calibri Light" panose="020F0302020204030204"/>
                 </a:rPr>
-                <a:t>Biokolprodukt användning</a:t>
+                <a:t>Användning av b</a:t>
+              </a:r>
+              <a:r>
+                <a:rPr lang="sv-SE" sz="2800" kern="0" dirty="0" smtClean="0">
+                  <a:solidFill>
+                    <a:prstClr val="black"/>
+                  </a:solidFill>
+                  <a:latin typeface="Calibri Light" panose="020F0302020204030204"/>
+                </a:rPr>
+                <a:t>iokolsprodukt</a:t>
               </a:r>
               <a:endParaRPr lang="sv-SE" sz="2800" kern="0" dirty="0">
                 <a:solidFill>
@@ -15022,22 +15071,14 @@
                   </a:solidFill>
                   <a:latin typeface="Calibri Light" panose="020F0302020204030204"/>
                 </a:rPr>
-                <a:t>Biokolprodukt</a:t>
+                <a:t>Hantering av avfall</a:t>
               </a:r>
-            </a:p>
-            <a:p>
-              <a:pPr algn="ctr" defTabSz="914346">
-                <a:defRPr/>
-              </a:pPr>
-              <a:r>
-                <a:rPr lang="sv-SE" sz="2800" kern="0" dirty="0">
-                  <a:solidFill>
-                    <a:prstClr val="black"/>
-                  </a:solidFill>
-                  <a:latin typeface="Calibri Light" panose="020F0302020204030204"/>
-                </a:rPr>
-                <a:t>bortskaffande</a:t>
-              </a:r>
+              <a:endParaRPr lang="sv-SE" sz="2800" kern="0" dirty="0" smtClean="0">
+                <a:solidFill>
+                  <a:prstClr val="black"/>
+                </a:solidFill>
+                <a:latin typeface="Calibri Light" panose="020F0302020204030204"/>
+              </a:endParaRPr>
             </a:p>
           </p:txBody>
         </p:sp>
@@ -15539,8 +15580,14 @@
                   </a:solidFill>
                   <a:latin typeface="Calibri Light" panose="020F0302020204030204"/>
                 </a:rPr>
-                <a:t>Referens</a:t>
+                <a:t>Referens-</a:t>
               </a:r>
+              <a:endParaRPr lang="sv-SE" sz="2001" kern="0" dirty="0" smtClean="0">
+                <a:solidFill>
+                  <a:prstClr val="black"/>
+                </a:solidFill>
+                <a:latin typeface="Calibri Light" panose="020F0302020204030204"/>
+              </a:endParaRPr>
             </a:p>
             <a:p>
               <a:pPr algn="ctr" defTabSz="914346">
@@ -15715,8 +15762,14 @@
                   </a:solidFill>
                   <a:latin typeface="Calibri Light" panose="020F0302020204030204"/>
                 </a:rPr>
-                <a:t>Referensmark</a:t>
+                <a:t>Referensmarks-</a:t>
               </a:r>
+              <a:endParaRPr lang="sv-SE" sz="2001" kern="0" dirty="0" smtClean="0">
+                <a:solidFill>
+                  <a:prstClr val="black"/>
+                </a:solidFill>
+                <a:latin typeface="Calibri Light" panose="020F0302020204030204"/>
+              </a:endParaRPr>
             </a:p>
             <a:p>
               <a:pPr algn="ctr" defTabSz="914346">
@@ -15848,14 +15901,20 @@
                 <a:defRPr/>
               </a:pPr>
               <a:r>
-                <a:rPr lang="sv-SE" sz="2001" kern="0" dirty="0">
+                <a:rPr lang="sv-SE" sz="2001" kern="0" dirty="0" smtClean="0">
                   <a:solidFill>
                     <a:prstClr val="black"/>
                   </a:solidFill>
                   <a:latin typeface="Calibri Light" panose="020F0302020204030204"/>
                 </a:rPr>
-                <a:t>Referens</a:t>
+                <a:t>Referens-</a:t>
               </a:r>
+              <a:endParaRPr lang="sv-SE" sz="2001" kern="0" dirty="0">
+                <a:solidFill>
+                  <a:prstClr val="black"/>
+                </a:solidFill>
+                <a:latin typeface="Calibri Light" panose="020F0302020204030204"/>
+              </a:endParaRPr>
             </a:p>
             <a:p>
               <a:pPr algn="ctr" defTabSz="914346">
@@ -16101,7 +16160,7 @@
                   </a:solidFill>
                   <a:latin typeface="Calibri Light" panose="020F0302020204030204"/>
                 </a:rPr>
-                <a:t>Referensbiomassa användning </a:t>
+                <a:t>Referens för användning av biomassa</a:t>
               </a:r>
               <a:endParaRPr lang="sv-SE" sz="2001" kern="0" dirty="0">
                 <a:solidFill>
@@ -16417,7 +16476,16 @@
                   </a:solidFill>
                   <a:latin typeface="Calibri Light" panose="020F0302020204030204"/>
                 </a:rPr>
-                <a:t>Miljöutsläpp eller resursupptag</a:t>
+                <a:t>Miljöpåverkan </a:t>
+              </a:r>
+              <a:r>
+                <a:rPr lang="sv-SE" kern="0" dirty="0" smtClean="0">
+                  <a:solidFill>
+                    <a:prstClr val="black"/>
+                  </a:solidFill>
+                  <a:latin typeface="Calibri Light" panose="020F0302020204030204"/>
+                </a:rPr>
+                <a:t>eller resursupptag</a:t>
               </a:r>
               <a:endParaRPr lang="sv-SE" kern="0" dirty="0">
                 <a:solidFill>
@@ -16469,17 +16537,14 @@
                   </a:solidFill>
                   <a:latin typeface="Calibri Light" panose="020F0302020204030204"/>
                 </a:rPr>
-                <a:t>produkt </a:t>
+                <a:t>produkter och tjänster </a:t>
               </a:r>
-              <a:r>
-                <a:rPr lang="sv-SE" kern="0" dirty="0">
-                  <a:solidFill>
-                    <a:prstClr val="black"/>
-                  </a:solidFill>
-                  <a:latin typeface="Calibri Light" panose="020F0302020204030204"/>
-                </a:rPr>
-                <a:t>eller tjänst ingångar </a:t>
-              </a:r>
+              <a:endParaRPr lang="sv-SE" kern="0" dirty="0">
+                <a:solidFill>
+                  <a:prstClr val="black"/>
+                </a:solidFill>
+                <a:latin typeface="Calibri Light" panose="020F0302020204030204"/>
+              </a:endParaRPr>
             </a:p>
           </p:txBody>
         </p:sp>
@@ -16588,7 +16653,7 @@
           <p:spPr>
             <a:xfrm>
               <a:off x="1665960" y="6760006"/>
-              <a:ext cx="1398140" cy="541046"/>
+              <a:ext cx="1468672" cy="535531"/>
             </a:xfrm>
             <a:prstGeom prst="rect">
               <a:avLst/>
@@ -16612,8 +16677,14 @@
                   </a:solidFill>
                   <a:latin typeface="Calibri Light" panose="020F0302020204030204"/>
                 </a:rPr>
-                <a:t>Substitutions</a:t>
+                <a:t>Substitutions-</a:t>
               </a:r>
+              <a:endParaRPr lang="sv-SE" kern="0" dirty="0" smtClean="0">
+                <a:solidFill>
+                  <a:prstClr val="black"/>
+                </a:solidFill>
+                <a:latin typeface="Calibri Light" panose="020F0302020204030204"/>
+              </a:endParaRPr>
             </a:p>
             <a:p>
               <a:pPr defTabSz="323219">
@@ -16718,13 +16789,22 @@
               </a:lnSpc>
             </a:pPr>
             <a:r>
+              <a:rPr lang="sv-SE" kern="0" dirty="0" smtClean="0">
+                <a:solidFill>
+                  <a:prstClr val="black"/>
+                </a:solidFill>
+                <a:latin typeface="Calibri Light" panose="020F0302020204030204"/>
+              </a:rPr>
+              <a:t>Produkt- </a:t>
+            </a:r>
+            <a:r>
               <a:rPr lang="sv-SE" kern="0" dirty="0">
                 <a:solidFill>
                   <a:prstClr val="black"/>
                 </a:solidFill>
                 <a:latin typeface="Calibri Light" panose="020F0302020204030204"/>
               </a:rPr>
-              <a:t>Produkt eller</a:t>
+              <a:t>eller</a:t>
             </a:r>
           </a:p>
           <a:p>
@@ -16788,14 +16868,29 @@
               </a:lnSpc>
             </a:pPr>
             <a:r>
-              <a:rPr lang="sv-SE" kern="0" dirty="0">
+              <a:rPr lang="sv-SE" kern="0" dirty="0" smtClean="0">
                 <a:solidFill>
                   <a:prstClr val="black"/>
                 </a:solidFill>
                 <a:latin typeface="Calibri Light" panose="020F0302020204030204"/>
               </a:rPr>
-              <a:t>genom biokolsystem</a:t>
+              <a:t>av</a:t>
             </a:r>
+            <a:r>
+              <a:rPr lang="sv-SE" kern="0" dirty="0" smtClean="0">
+                <a:solidFill>
+                  <a:prstClr val="black"/>
+                </a:solidFill>
+                <a:latin typeface="Calibri Light" panose="020F0302020204030204"/>
+              </a:rPr>
+              <a:t> biokolssystemet</a:t>
+            </a:r>
+            <a:endParaRPr lang="sv-SE" kern="0" dirty="0">
+              <a:solidFill>
+                <a:prstClr val="black"/>
+              </a:solidFill>
+              <a:latin typeface="Calibri Light" panose="020F0302020204030204"/>
+            </a:endParaRPr>
           </a:p>
         </p:txBody>
       </p:sp>
@@ -16948,8 +17043,8 @@
         </p:nvSpPr>
         <p:spPr>
           <a:xfrm>
-            <a:off x="4577401" y="3505305"/>
-            <a:ext cx="878767" cy="369332"/>
+            <a:off x="4716863" y="3505305"/>
+            <a:ext cx="739305" cy="369332"/>
           </a:xfrm>
           <a:prstGeom prst="rect">
             <a:avLst/>
@@ -16962,6 +17057,67 @@
           <a:lstStyle/>
           <a:p>
             <a:pPr algn="r" defTabSz="323219"/>
+            <a:r>
+              <a:rPr lang="sv-SE" i="1" kern="0" dirty="0" err="1" smtClean="0">
+                <a:solidFill>
+                  <a:prstClr val="black"/>
+                </a:solidFill>
+                <a:latin typeface="Calibri Light" panose="020F0302020204030204"/>
+              </a:rPr>
+              <a:t>biokol</a:t>
+            </a:r>
+            <a:endParaRPr lang="sv-SE" i="1" kern="0" dirty="0">
+              <a:solidFill>
+                <a:prstClr val="black"/>
+              </a:solidFill>
+            </a:endParaRPr>
+          </a:p>
+        </p:txBody>
+      </p:sp>
+      <p:sp>
+        <p:nvSpPr>
+          <p:cNvPr id="104" name="Rectangle 103"/>
+          <p:cNvSpPr/>
+          <p:nvPr/>
+        </p:nvSpPr>
+        <p:spPr>
+          <a:xfrm>
+            <a:off x="6749948" y="4191244"/>
+            <a:ext cx="907621" cy="923330"/>
+          </a:xfrm>
+          <a:prstGeom prst="rect">
+            <a:avLst/>
+          </a:prstGeom>
+        </p:spPr>
+        <p:txBody>
+          <a:bodyPr wrap="none">
+            <a:spAutoFit/>
+          </a:bodyPr>
+          <a:lstStyle/>
+          <a:p>
+            <a:pPr defTabSz="323219">
+              <a:lnSpc>
+                <a:spcPct val="150000"/>
+              </a:lnSpc>
+            </a:pPr>
+            <a:r>
+              <a:rPr lang="sv-SE" i="1" kern="0" dirty="0" err="1" smtClean="0">
+                <a:solidFill>
+                  <a:prstClr val="black"/>
+                </a:solidFill>
+                <a:latin typeface="Calibri Light" panose="020F0302020204030204"/>
+              </a:rPr>
+              <a:t>b</a:t>
+            </a:r>
+            <a:r>
+              <a:rPr lang="sv-SE" i="1" kern="0" dirty="0" err="1" smtClean="0">
+                <a:solidFill>
+                  <a:prstClr val="black"/>
+                </a:solidFill>
+                <a:latin typeface="Calibri Light" panose="020F0302020204030204"/>
+              </a:rPr>
+              <a:t>iokols</a:t>
+            </a:r>
             <a:r>
               <a:rPr lang="sv-SE" i="1" kern="0" dirty="0" smtClean="0">
                 <a:solidFill>
@@ -16969,51 +17125,14 @@
                 </a:solidFill>
                 <a:latin typeface="Calibri Light" panose="020F0302020204030204"/>
               </a:rPr>
-              <a:t>biochar</a:t>
+              <a:t>-</a:t>
             </a:r>
-            <a:endParaRPr lang="sv-SE" i="1" kern="0" dirty="0">
+            <a:endParaRPr lang="sv-SE" i="1" kern="0" dirty="0" smtClean="0">
               <a:solidFill>
                 <a:prstClr val="black"/>
               </a:solidFill>
+              <a:latin typeface="Calibri Light" panose="020F0302020204030204"/>
             </a:endParaRPr>
-          </a:p>
-        </p:txBody>
-      </p:sp>
-      <p:sp>
-        <p:nvSpPr>
-          <p:cNvPr id="104" name="Rectangle 103"/>
-          <p:cNvSpPr/>
-          <p:nvPr/>
-        </p:nvSpPr>
-        <p:spPr>
-          <a:xfrm>
-            <a:off x="6749948" y="4191244"/>
-            <a:ext cx="907621" cy="923330"/>
-          </a:xfrm>
-          <a:prstGeom prst="rect">
-            <a:avLst/>
-          </a:prstGeom>
-        </p:spPr>
-        <p:txBody>
-          <a:bodyPr wrap="none">
-            <a:spAutoFit/>
-          </a:bodyPr>
-          <a:lstStyle/>
-          <a:p>
-            <a:pPr defTabSz="323219">
-              <a:lnSpc>
-                <a:spcPct val="150000"/>
-              </a:lnSpc>
-            </a:pPr>
-            <a:r>
-              <a:rPr lang="sv-SE" i="1" kern="0" dirty="0" smtClean="0">
-                <a:solidFill>
-                  <a:prstClr val="black"/>
-                </a:solidFill>
-                <a:latin typeface="Calibri Light" panose="020F0302020204030204"/>
-              </a:rPr>
-              <a:t>biokol</a:t>
-            </a:r>
           </a:p>
           <a:p>
             <a:pPr defTabSz="323219">
@@ -17047,7 +17166,7 @@
         <p:spPr>
           <a:xfrm>
             <a:off x="10114380" y="4202214"/>
-            <a:ext cx="907621" cy="923330"/>
+            <a:ext cx="689612" cy="923330"/>
           </a:xfrm>
           <a:prstGeom prst="rect">
             <a:avLst/>
@@ -17080,15 +17199,6 @@
                 <a:spcPct val="150000"/>
               </a:lnSpc>
             </a:pPr>
-            <a:r>
-              <a:rPr lang="sv-SE" i="1" kern="0" dirty="0" smtClean="0">
-                <a:solidFill>
-                  <a:prstClr val="black"/>
-                </a:solidFill>
-                <a:latin typeface="Calibri Light" panose="020F0302020204030204"/>
-              </a:rPr>
-              <a:t>produkt</a:t>
-            </a:r>
             <a:endParaRPr lang="sv-SE" i="1" kern="0" dirty="0">
               <a:solidFill>
                 <a:prstClr val="black"/>

</xml_diff>